<commit_message>
update slides in class 3-23
</commit_message>
<xml_diff>
--- a/Presentation.pptx
+++ b/Presentation.pptx
@@ -6,13 +6,14 @@
   </p:sldMasterIdLst>
   <p:sldIdLst>
     <p:sldId id="256" r:id="rId2"/>
-    <p:sldId id="257" r:id="rId3"/>
-    <p:sldId id="258" r:id="rId4"/>
-    <p:sldId id="259" r:id="rId5"/>
-    <p:sldId id="260" r:id="rId6"/>
-    <p:sldId id="261" r:id="rId7"/>
-    <p:sldId id="262" r:id="rId8"/>
-    <p:sldId id="263" r:id="rId9"/>
+    <p:sldId id="264" r:id="rId3"/>
+    <p:sldId id="257" r:id="rId4"/>
+    <p:sldId id="258" r:id="rId5"/>
+    <p:sldId id="259" r:id="rId6"/>
+    <p:sldId id="260" r:id="rId7"/>
+    <p:sldId id="261" r:id="rId8"/>
+    <p:sldId id="262" r:id="rId9"/>
+    <p:sldId id="263" r:id="rId10"/>
   </p:sldIdLst>
   <p:sldSz cx="12192000" cy="6858000"/>
   <p:notesSz cx="6858000" cy="9144000"/>
@@ -111,6 +112,11 @@
       </a:defRPr>
     </a:lvl9pPr>
   </p:defaultTextStyle>
+  <p:extLst>
+    <p:ext uri="{EFAFB233-063F-42B5-8137-9DF3F51BA10A}">
+      <p15:sldGuideLst xmlns:p15="http://schemas.microsoft.com/office/powerpoint/2012/main"/>
+    </p:ext>
+  </p:extLst>
 </p:presentation>
 </file>
 
@@ -149,7 +155,7 @@
 Define the core message or hypothesis of your project.
 Describe the questions you asked, and why you asked them
 Describe whether you were able to answer these questions to your satisfaction, and briefly summarize your findings</p:text>
-    <p:extLst>
+    <p:extLst mod="1">
       <p:ext uri="{C676402C-5697-4E1C-873F-D02D1690AC5C}">
         <p15:threadingInfo xmlns:p15="http://schemas.microsoft.com/office/powerpoint/2012/main" timeZoneBias="300"/>
       </p:ext>
@@ -400,7 +406,7 @@
           <a:p>
             <a:fld id="{F7455CEF-1895-499D-A216-CAA26BBACD9A}" type="datetimeFigureOut">
               <a:rPr lang="en-US" smtClean="0"/>
-              <a:t>3/22/2019</a:t>
+              <a:t>3/23/2019</a:t>
             </a:fld>
             <a:endParaRPr lang="en-US"/>
           </a:p>
@@ -598,7 +604,7 @@
           <a:p>
             <a:fld id="{F7455CEF-1895-499D-A216-CAA26BBACD9A}" type="datetimeFigureOut">
               <a:rPr lang="en-US" smtClean="0"/>
-              <a:t>3/22/2019</a:t>
+              <a:t>3/23/2019</a:t>
             </a:fld>
             <a:endParaRPr lang="en-US"/>
           </a:p>
@@ -806,7 +812,7 @@
           <a:p>
             <a:fld id="{F7455CEF-1895-499D-A216-CAA26BBACD9A}" type="datetimeFigureOut">
               <a:rPr lang="en-US" smtClean="0"/>
-              <a:t>3/22/2019</a:t>
+              <a:t>3/23/2019</a:t>
             </a:fld>
             <a:endParaRPr lang="en-US"/>
           </a:p>
@@ -1004,7 +1010,7 @@
           <a:p>
             <a:fld id="{F7455CEF-1895-499D-A216-CAA26BBACD9A}" type="datetimeFigureOut">
               <a:rPr lang="en-US" smtClean="0"/>
-              <a:t>3/22/2019</a:t>
+              <a:t>3/23/2019</a:t>
             </a:fld>
             <a:endParaRPr lang="en-US"/>
           </a:p>
@@ -1279,7 +1285,7 @@
           <a:p>
             <a:fld id="{F7455CEF-1895-499D-A216-CAA26BBACD9A}" type="datetimeFigureOut">
               <a:rPr lang="en-US" smtClean="0"/>
-              <a:t>3/22/2019</a:t>
+              <a:t>3/23/2019</a:t>
             </a:fld>
             <a:endParaRPr lang="en-US"/>
           </a:p>
@@ -1544,7 +1550,7 @@
           <a:p>
             <a:fld id="{F7455CEF-1895-499D-A216-CAA26BBACD9A}" type="datetimeFigureOut">
               <a:rPr lang="en-US" smtClean="0"/>
-              <a:t>3/22/2019</a:t>
+              <a:t>3/23/2019</a:t>
             </a:fld>
             <a:endParaRPr lang="en-US"/>
           </a:p>
@@ -1956,7 +1962,7 @@
           <a:p>
             <a:fld id="{F7455CEF-1895-499D-A216-CAA26BBACD9A}" type="datetimeFigureOut">
               <a:rPr lang="en-US" smtClean="0"/>
-              <a:t>3/22/2019</a:t>
+              <a:t>3/23/2019</a:t>
             </a:fld>
             <a:endParaRPr lang="en-US"/>
           </a:p>
@@ -2097,7 +2103,7 @@
           <a:p>
             <a:fld id="{F7455CEF-1895-499D-A216-CAA26BBACD9A}" type="datetimeFigureOut">
               <a:rPr lang="en-US" smtClean="0"/>
-              <a:t>3/22/2019</a:t>
+              <a:t>3/23/2019</a:t>
             </a:fld>
             <a:endParaRPr lang="en-US"/>
           </a:p>
@@ -2210,7 +2216,7 @@
           <a:p>
             <a:fld id="{F7455CEF-1895-499D-A216-CAA26BBACD9A}" type="datetimeFigureOut">
               <a:rPr lang="en-US" smtClean="0"/>
-              <a:t>3/22/2019</a:t>
+              <a:t>3/23/2019</a:t>
             </a:fld>
             <a:endParaRPr lang="en-US"/>
           </a:p>
@@ -2521,7 +2527,7 @@
           <a:p>
             <a:fld id="{F7455CEF-1895-499D-A216-CAA26BBACD9A}" type="datetimeFigureOut">
               <a:rPr lang="en-US" smtClean="0"/>
-              <a:t>3/22/2019</a:t>
+              <a:t>3/23/2019</a:t>
             </a:fld>
             <a:endParaRPr lang="en-US"/>
           </a:p>
@@ -2809,7 +2815,7 @@
           <a:p>
             <a:fld id="{F7455CEF-1895-499D-A216-CAA26BBACD9A}" type="datetimeFigureOut">
               <a:rPr lang="en-US" smtClean="0"/>
-              <a:t>3/22/2019</a:t>
+              <a:t>3/23/2019</a:t>
             </a:fld>
             <a:endParaRPr lang="en-US"/>
           </a:p>
@@ -3050,7 +3056,7 @@
           <a:p>
             <a:fld id="{F7455CEF-1895-499D-A216-CAA26BBACD9A}" type="datetimeFigureOut">
               <a:rPr lang="en-US" smtClean="0"/>
-              <a:t>3/22/2019</a:t>
+              <a:t>3/23/2019</a:t>
             </a:fld>
             <a:endParaRPr lang="en-US"/>
           </a:p>
@@ -3620,17 +3626,6 @@
 <file path=ppt/slides/slide2.xml><?xml version="1.0" encoding="utf-8"?>
 <p:sld xmlns:a="http://schemas.openxmlformats.org/drawingml/2006/main" xmlns:r="http://schemas.openxmlformats.org/officeDocument/2006/relationships" xmlns:p="http://schemas.openxmlformats.org/presentationml/2006/main">
   <p:cSld>
-    <p:bg>
-      <p:bgPr>
-        <a:solidFill>
-          <a:schemeClr val="accent6">
-            <a:lumMod val="40000"/>
-            <a:lumOff val="60000"/>
-          </a:schemeClr>
-        </a:solidFill>
-        <a:effectLst/>
-      </p:bgPr>
-    </p:bg>
     <p:spTree>
       <p:nvGrpSpPr>
         <p:cNvPr id="1" name=""/>
@@ -3650,7 +3645,7 @@
           <p:cNvPr id="2" name="Title 1">
             <a:extLst>
               <a:ext uri="{FF2B5EF4-FFF2-40B4-BE49-F238E27FC236}">
-                <a16:creationId xmlns:a16="http://schemas.microsoft.com/office/drawing/2014/main" id="{E3D3871E-AB2C-41E6-A4EB-F8C28463AB9B}"/>
+                <a16:creationId xmlns:a16="http://schemas.microsoft.com/office/drawing/2014/main" id="{F93CFD60-E7EC-452D-BE83-857CBFD8A3B8}"/>
               </a:ext>
             </a:extLst>
           </p:cNvPr>
@@ -3661,95 +3656,106 @@
             <p:ph type="title"/>
           </p:nvPr>
         </p:nvSpPr>
-        <p:spPr>
-          <a:xfrm>
-            <a:off x="838200" y="365125"/>
-            <a:ext cx="10515600" cy="549275"/>
-          </a:xfrm>
-        </p:spPr>
-        <p:txBody>
-          <a:bodyPr>
-            <a:normAutofit fontScale="90000"/>
-          </a:bodyPr>
-          <a:lstStyle/>
-          <a:p>
+        <p:spPr/>
+        <p:txBody>
+          <a:bodyPr/>
+          <a:lstStyle/>
+          <a:p>
+            <a:r>
+              <a:rPr lang="en-US" dirty="0"/>
+              <a:t>Scope</a:t>
+            </a:r>
+          </a:p>
+        </p:txBody>
+      </p:sp>
+      <p:sp>
+        <p:nvSpPr>
+          <p:cNvPr id="3" name="Content Placeholder 2">
+            <a:extLst>
+              <a:ext uri="{FF2B5EF4-FFF2-40B4-BE49-F238E27FC236}">
+                <a16:creationId xmlns:a16="http://schemas.microsoft.com/office/drawing/2014/main" id="{6FA6AF7D-CE65-4468-BCD6-EC3673686E2E}"/>
+              </a:ext>
+            </a:extLst>
+          </p:cNvPr>
+          <p:cNvSpPr>
+            <a:spLocks noGrp="1"/>
+          </p:cNvSpPr>
+          <p:nvPr>
+            <p:ph idx="1"/>
+          </p:nvPr>
+        </p:nvSpPr>
+        <p:spPr/>
+        <p:txBody>
+          <a:bodyPr/>
+          <a:lstStyle/>
+          <a:p>
+            <a:r>
+              <a:rPr lang="en-US" dirty="0"/>
+              <a:t>As a group we decided to focus on two cites: </a:t>
+            </a:r>
+          </a:p>
+          <a:p>
+            <a:pPr lvl="1"/>
+            <a:r>
+              <a:rPr lang="en-US" dirty="0"/>
+              <a:t>St Louis , Missouri (This city was what help us find a topic because of its high drop out rate – understanding that we would more likely not be able to disprove the null hypothesis. Its also the 2</a:t>
+            </a:r>
+            <a:r>
+              <a:rPr lang="en-US" baseline="30000" dirty="0"/>
+              <a:t>nd</a:t>
+            </a:r>
+            <a:r>
+              <a:rPr lang="en-US" dirty="0"/>
+              <a:t> most dangerous metro city:  https://www.safewise.com/blog/safest-metro-cities/</a:t>
+            </a:r>
+          </a:p>
+          <a:p>
+            <a:pPr lvl="1"/>
+            <a:r>
+              <a:rPr lang="en-US" dirty="0"/>
+              <a:t>Virginia Beach, Virginia – (This city was identified as the safest city </a:t>
+            </a:r>
+          </a:p>
+          <a:p>
+            <a:pPr marL="457200" lvl="1" indent="0">
+              <a:buNone/>
+            </a:pPr>
             <a:r>
               <a:rPr lang="en-US" dirty="0">
-                <a:solidFill>
-                  <a:srgbClr val="000000"/>
-                </a:solidFill>
-                <a:latin typeface="+mn-lt"/>
+                <a:hlinkClick r:id="rId2"/>
               </a:rPr>
-              <a:t>Motivation and Summary</a:t>
-            </a:r>
-          </a:p>
-        </p:txBody>
-      </p:sp>
-      <p:sp>
-        <p:nvSpPr>
-          <p:cNvPr id="3" name="Content Placeholder 2">
-            <a:extLst>
-              <a:ext uri="{FF2B5EF4-FFF2-40B4-BE49-F238E27FC236}">
-                <a16:creationId xmlns:a16="http://schemas.microsoft.com/office/drawing/2014/main" id="{8A1211E0-75FD-45A4-9FE2-5A87C530FEA1}"/>
-              </a:ext>
-            </a:extLst>
-          </p:cNvPr>
-          <p:cNvSpPr>
-            <a:spLocks noGrp="1"/>
-          </p:cNvSpPr>
-          <p:nvPr>
-            <p:ph idx="1"/>
-          </p:nvPr>
-        </p:nvSpPr>
-        <p:spPr>
-          <a:xfrm>
-            <a:off x="838200" y="1253331"/>
-            <a:ext cx="10515600" cy="4351338"/>
-          </a:xfrm>
-        </p:spPr>
-        <p:txBody>
-          <a:bodyPr/>
-          <a:lstStyle/>
-          <a:p>
-            <a:r>
-              <a:rPr lang="en-US" sz="2400" dirty="0"/>
-              <a:t>Our group had several ideas – but finding enough data to support our ideas proved to be challenging. With time and schedule constraints we settled on education – high school dropout rates specifically. </a:t>
-            </a:r>
-          </a:p>
-          <a:p>
-            <a:pPr lvl="1"/>
-            <a:r>
-              <a:rPr lang="en-US" sz="2000" dirty="0"/>
-              <a:t>Is there a correlation between student/teacher ratios and high school dropout rates?</a:t>
-            </a:r>
-          </a:p>
-          <a:p>
-            <a:pPr lvl="1"/>
-            <a:r>
-              <a:rPr lang="en-US" sz="2000" dirty="0"/>
-              <a:t> Is there a correlation between the high school dropout rate and crime in the area? </a:t>
-            </a:r>
-          </a:p>
-          <a:p>
-            <a:pPr lvl="1"/>
-            <a:r>
-              <a:rPr lang="en-US" sz="2000" dirty="0"/>
-              <a:t>Is there a correlation between high school dropout rates and the prison population or juvenile arrests? </a:t>
-            </a:r>
-          </a:p>
-          <a:p>
-            <a:r>
-              <a:rPr lang="en-US" sz="2400" dirty="0"/>
-              <a:t>What we discovered….</a:t>
-            </a:r>
-          </a:p>
-          <a:p>
-            <a:pPr marL="0" indent="0">
+              <a:t>https://www.safewise.com/blog/safest-metro-cities/</a:t>
+            </a:r>
+            <a:r>
+              <a:rPr lang="en-US" dirty="0"/>
+              <a:t>)</a:t>
+            </a:r>
+          </a:p>
+          <a:p>
+            <a:pPr marL="457200" lvl="1" indent="0">
               <a:buNone/>
             </a:pPr>
             <a:endParaRPr lang="en-US" dirty="0"/>
           </a:p>
           <a:p>
+            <a:pPr marL="457200" lvl="1" indent="0">
+              <a:buNone/>
+            </a:pPr>
+            <a:endParaRPr lang="en-US" dirty="0"/>
+          </a:p>
+          <a:p>
+            <a:pPr marL="457200" lvl="1" indent="0">
+              <a:buNone/>
+            </a:pPr>
+            <a:r>
+              <a:rPr lang="en-US" dirty="0"/>
+              <a:t>Limiting the scope helped up move forward to data collection. </a:t>
+            </a:r>
+          </a:p>
+          <a:p>
+            <a:pPr marL="457200" lvl="1" indent="0">
+              <a:buNone/>
+            </a:pPr>
             <a:endParaRPr lang="en-US" dirty="0"/>
           </a:p>
         </p:txBody>
@@ -3757,7 +3763,7 @@
     </p:spTree>
     <p:extLst>
       <p:ext uri="{BB962C8B-B14F-4D97-AF65-F5344CB8AC3E}">
-        <p14:creationId xmlns:p14="http://schemas.microsoft.com/office/powerpoint/2010/main" val="915606665"/>
+        <p14:creationId xmlns:p14="http://schemas.microsoft.com/office/powerpoint/2010/main" val="2036333267"/>
       </p:ext>
     </p:extLst>
   </p:cSld>
@@ -3800,7 +3806,7 @@
           <p:cNvPr id="2" name="Title 1">
             <a:extLst>
               <a:ext uri="{FF2B5EF4-FFF2-40B4-BE49-F238E27FC236}">
-                <a16:creationId xmlns:a16="http://schemas.microsoft.com/office/drawing/2014/main" id="{1CB10B29-CF91-48A9-9DF8-48AC316EED46}"/>
+                <a16:creationId xmlns:a16="http://schemas.microsoft.com/office/drawing/2014/main" id="{E3D3871E-AB2C-41E6-A4EB-F8C28463AB9B}"/>
               </a:ext>
             </a:extLst>
           </p:cNvPr>
@@ -3814,7 +3820,7 @@
         <p:spPr>
           <a:xfrm>
             <a:off x="838200" y="365125"/>
-            <a:ext cx="10515600" cy="625475"/>
+            <a:ext cx="10515600" cy="549275"/>
           </a:xfrm>
         </p:spPr>
         <p:txBody>
@@ -3825,9 +3831,12 @@
           <a:p>
             <a:r>
               <a:rPr lang="en-US" dirty="0">
+                <a:solidFill>
+                  <a:srgbClr val="000000"/>
+                </a:solidFill>
                 <a:latin typeface="+mn-lt"/>
               </a:rPr>
-              <a:t>Questions and Data</a:t>
+              <a:t>Motivation and Summary</a:t>
             </a:r>
           </a:p>
         </p:txBody>
@@ -3837,7 +3846,7 @@
           <p:cNvPr id="3" name="Content Placeholder 2">
             <a:extLst>
               <a:ext uri="{FF2B5EF4-FFF2-40B4-BE49-F238E27FC236}">
-                <a16:creationId xmlns:a16="http://schemas.microsoft.com/office/drawing/2014/main" id="{9840A4E9-E3F0-4D82-884D-86C06D657C3A}"/>
+                <a16:creationId xmlns:a16="http://schemas.microsoft.com/office/drawing/2014/main" id="{8A1211E0-75FD-45A4-9FE2-5A87C530FEA1}"/>
               </a:ext>
             </a:extLst>
           </p:cNvPr>
@@ -3858,9 +3867,58 @@
           <a:bodyPr/>
           <a:lstStyle/>
           <a:p>
+            <a:r>
+              <a:rPr lang="en-US" sz="2400" dirty="0"/>
+              <a:t>Schools with higher student/teacher ratios have higher dropout rates (lower graduation rates) </a:t>
+            </a:r>
+          </a:p>
+          <a:p>
+            <a:pPr lvl="1"/>
+            <a:r>
+              <a:rPr lang="en-US" sz="2000" dirty="0"/>
+              <a:t>Is there a correlation between student/teacher ratios and high school dropout rates?</a:t>
+            </a:r>
+          </a:p>
+          <a:p>
+            <a:pPr lvl="1"/>
+            <a:r>
+              <a:rPr lang="en-US" sz="2000" dirty="0"/>
+              <a:t>Is there a correlation between the high school dropout rate and crime in the area? </a:t>
+            </a:r>
+          </a:p>
+          <a:p>
+            <a:pPr lvl="1"/>
+            <a:r>
+              <a:rPr lang="en-US" sz="2000" dirty="0"/>
+              <a:t>Is there a correlation between high school dropout rates and the prison population or juvenile arrests? </a:t>
+            </a:r>
+          </a:p>
+          <a:p>
+            <a:pPr marL="457200" lvl="1" indent="0">
+              <a:buNone/>
+            </a:pPr>
+            <a:r>
+              <a:rPr lang="en-US" sz="2000" dirty="0"/>
+              <a:t>Our group had several ideas – but finding enough data to support our ideas proved to be challenging. With time and schedule constraints we settled on education – high school dropout rates specifically. </a:t>
+            </a:r>
+          </a:p>
+          <a:p>
+            <a:r>
+              <a:rPr lang="en-US" sz="2400" dirty="0">
+                <a:highlight>
+                  <a:srgbClr val="FFFF00"/>
+                </a:highlight>
+              </a:rPr>
+              <a:t>What we discovered….</a:t>
+            </a:r>
+          </a:p>
+          <a:p>
             <a:pPr marL="0" indent="0">
               <a:buNone/>
             </a:pPr>
+            <a:endParaRPr lang="en-US" dirty="0"/>
+          </a:p>
+          <a:p>
             <a:endParaRPr lang="en-US" dirty="0"/>
           </a:p>
         </p:txBody>
@@ -3868,7 +3926,7 @@
     </p:spTree>
     <p:extLst>
       <p:ext uri="{BB962C8B-B14F-4D97-AF65-F5344CB8AC3E}">
-        <p14:creationId xmlns:p14="http://schemas.microsoft.com/office/powerpoint/2010/main" val="3495595817"/>
+        <p14:creationId xmlns:p14="http://schemas.microsoft.com/office/powerpoint/2010/main" val="915606665"/>
       </p:ext>
     </p:extLst>
   </p:cSld>
@@ -3881,6 +3939,17 @@
 <file path=ppt/slides/slide4.xml><?xml version="1.0" encoding="utf-8"?>
 <p:sld xmlns:a="http://schemas.openxmlformats.org/drawingml/2006/main" xmlns:r="http://schemas.openxmlformats.org/officeDocument/2006/relationships" xmlns:p="http://schemas.openxmlformats.org/presentationml/2006/main">
   <p:cSld>
+    <p:bg>
+      <p:bgPr>
+        <a:solidFill>
+          <a:schemeClr val="accent6">
+            <a:lumMod val="40000"/>
+            <a:lumOff val="60000"/>
+          </a:schemeClr>
+        </a:solidFill>
+        <a:effectLst/>
+      </p:bgPr>
+    </p:bg>
     <p:spTree>
       <p:nvGrpSpPr>
         <p:cNvPr id="1" name=""/>
@@ -3900,7 +3969,7 @@
           <p:cNvPr id="2" name="Title 1">
             <a:extLst>
               <a:ext uri="{FF2B5EF4-FFF2-40B4-BE49-F238E27FC236}">
-                <a16:creationId xmlns:a16="http://schemas.microsoft.com/office/drawing/2014/main" id="{6D3A3270-04B2-4D07-A87F-B183693408AD}"/>
+                <a16:creationId xmlns:a16="http://schemas.microsoft.com/office/drawing/2014/main" id="{1CB10B29-CF91-48A9-9DF8-48AC316EED46}"/>
               </a:ext>
             </a:extLst>
           </p:cNvPr>
@@ -3911,12 +3980,24 @@
             <p:ph type="title"/>
           </p:nvPr>
         </p:nvSpPr>
-        <p:spPr/>
-        <p:txBody>
-          <a:bodyPr/>
-          <a:lstStyle/>
-          <a:p>
-            <a:endParaRPr lang="en-US"/>
+        <p:spPr>
+          <a:xfrm>
+            <a:off x="838200" y="365125"/>
+            <a:ext cx="10515600" cy="625475"/>
+          </a:xfrm>
+        </p:spPr>
+        <p:txBody>
+          <a:bodyPr>
+            <a:normAutofit fontScale="90000"/>
+          </a:bodyPr>
+          <a:lstStyle/>
+          <a:p>
+            <a:r>
+              <a:rPr lang="en-US" dirty="0">
+                <a:latin typeface="+mn-lt"/>
+              </a:rPr>
+              <a:t>Questions and Data</a:t>
+            </a:r>
           </a:p>
         </p:txBody>
       </p:sp>
@@ -3925,7 +4006,7 @@
           <p:cNvPr id="3" name="Content Placeholder 2">
             <a:extLst>
               <a:ext uri="{FF2B5EF4-FFF2-40B4-BE49-F238E27FC236}">
-                <a16:creationId xmlns:a16="http://schemas.microsoft.com/office/drawing/2014/main" id="{2AA31897-463A-4EC1-A0DC-D33CDC575655}"/>
+                <a16:creationId xmlns:a16="http://schemas.microsoft.com/office/drawing/2014/main" id="{9840A4E9-E3F0-4D82-884D-86C06D657C3A}"/>
               </a:ext>
             </a:extLst>
           </p:cNvPr>
@@ -3936,19 +4017,52 @@
             <p:ph idx="1"/>
           </p:nvPr>
         </p:nvSpPr>
-        <p:spPr/>
-        <p:txBody>
-          <a:bodyPr/>
-          <a:lstStyle/>
-          <a:p>
-            <a:endParaRPr lang="en-US"/>
+        <p:spPr>
+          <a:xfrm>
+            <a:off x="838200" y="1253331"/>
+            <a:ext cx="10515600" cy="4351338"/>
+          </a:xfrm>
+        </p:spPr>
+        <p:txBody>
+          <a:bodyPr/>
+          <a:lstStyle/>
+          <a:p>
+            <a:pPr lvl="1"/>
+            <a:r>
+              <a:rPr lang="en-US" sz="2000" dirty="0"/>
+              <a:t>Is there a correlation between student/teacher ratios and high school dropout rates?</a:t>
+            </a:r>
+          </a:p>
+          <a:p>
+            <a:pPr lvl="1"/>
+            <a:endParaRPr lang="en-US" sz="2000" dirty="0"/>
+          </a:p>
+          <a:p>
+            <a:pPr lvl="1"/>
+            <a:r>
+              <a:rPr lang="en-US" sz="2000" dirty="0"/>
+              <a:t>Is there a correlation between the high school dropout rate and crime in the area? </a:t>
+            </a:r>
+          </a:p>
+          <a:p>
+            <a:pPr lvl="1"/>
+            <a:r>
+              <a:rPr lang="en-US" sz="2000" dirty="0"/>
+              <a:t>Is there a correlation between high school dropout rates and the prison population or juvenile arrests? </a:t>
+            </a:r>
+          </a:p>
+          <a:p>
+            <a:pPr marL="0" indent="0">
+              <a:buNone/>
+            </a:pPr>
+            <a:endParaRPr lang="en-US" dirty="0"/>
           </a:p>
         </p:txBody>
       </p:sp>
     </p:spTree>
     <p:extLst>
       <p:ext uri="{BB962C8B-B14F-4D97-AF65-F5344CB8AC3E}">
-        <p14:creationId xmlns:p14="http://schemas.microsoft.com/office/powerpoint/2010/main" val="3485041124"/>
+        <p14:creationId xmlns:p14="http://schemas.microsoft.com/office/powerpoint/2010/main" val="3495595817"/>
       </p:ext>
     </p:extLst>
   </p:cSld>
@@ -3980,7 +4094,7 @@
           <p:cNvPr id="2" name="Title 1">
             <a:extLst>
               <a:ext uri="{FF2B5EF4-FFF2-40B4-BE49-F238E27FC236}">
-                <a16:creationId xmlns:a16="http://schemas.microsoft.com/office/drawing/2014/main" id="{4BE80D8D-302E-48C4-81DB-A0FDB3E26B50}"/>
+                <a16:creationId xmlns:a16="http://schemas.microsoft.com/office/drawing/2014/main" id="{6D3A3270-04B2-4D07-A87F-B183693408AD}"/>
               </a:ext>
             </a:extLst>
           </p:cNvPr>
@@ -4005,7 +4119,7 @@
           <p:cNvPr id="3" name="Content Placeholder 2">
             <a:extLst>
               <a:ext uri="{FF2B5EF4-FFF2-40B4-BE49-F238E27FC236}">
-                <a16:creationId xmlns:a16="http://schemas.microsoft.com/office/drawing/2014/main" id="{817AC6B5-8ABA-4B24-8905-7B8CE5DCD179}"/>
+                <a16:creationId xmlns:a16="http://schemas.microsoft.com/office/drawing/2014/main" id="{2AA31897-463A-4EC1-A0DC-D33CDC575655}"/>
               </a:ext>
             </a:extLst>
           </p:cNvPr>
@@ -4028,7 +4142,7 @@
     </p:spTree>
     <p:extLst>
       <p:ext uri="{BB962C8B-B14F-4D97-AF65-F5344CB8AC3E}">
-        <p14:creationId xmlns:p14="http://schemas.microsoft.com/office/powerpoint/2010/main" val="1693965003"/>
+        <p14:creationId xmlns:p14="http://schemas.microsoft.com/office/powerpoint/2010/main" val="3485041124"/>
       </p:ext>
     </p:extLst>
   </p:cSld>
@@ -4060,7 +4174,7 @@
           <p:cNvPr id="2" name="Title 1">
             <a:extLst>
               <a:ext uri="{FF2B5EF4-FFF2-40B4-BE49-F238E27FC236}">
-                <a16:creationId xmlns:a16="http://schemas.microsoft.com/office/drawing/2014/main" id="{42CC7139-EFCE-4D43-92AB-3E680D3B64AB}"/>
+                <a16:creationId xmlns:a16="http://schemas.microsoft.com/office/drawing/2014/main" id="{4BE80D8D-302E-48C4-81DB-A0FDB3E26B50}"/>
               </a:ext>
             </a:extLst>
           </p:cNvPr>
@@ -4085,7 +4199,7 @@
           <p:cNvPr id="3" name="Content Placeholder 2">
             <a:extLst>
               <a:ext uri="{FF2B5EF4-FFF2-40B4-BE49-F238E27FC236}">
-                <a16:creationId xmlns:a16="http://schemas.microsoft.com/office/drawing/2014/main" id="{45DB0F31-67F5-4B40-97BC-EA021544352A}"/>
+                <a16:creationId xmlns:a16="http://schemas.microsoft.com/office/drawing/2014/main" id="{817AC6B5-8ABA-4B24-8905-7B8CE5DCD179}"/>
               </a:ext>
             </a:extLst>
           </p:cNvPr>
@@ -4108,7 +4222,7 @@
     </p:spTree>
     <p:extLst>
       <p:ext uri="{BB962C8B-B14F-4D97-AF65-F5344CB8AC3E}">
-        <p14:creationId xmlns:p14="http://schemas.microsoft.com/office/powerpoint/2010/main" val="3030890866"/>
+        <p14:creationId xmlns:p14="http://schemas.microsoft.com/office/powerpoint/2010/main" val="1693965003"/>
       </p:ext>
     </p:extLst>
   </p:cSld>
@@ -4140,6 +4254,86 @@
           <p:cNvPr id="2" name="Title 1">
             <a:extLst>
               <a:ext uri="{FF2B5EF4-FFF2-40B4-BE49-F238E27FC236}">
+                <a16:creationId xmlns:a16="http://schemas.microsoft.com/office/drawing/2014/main" id="{42CC7139-EFCE-4D43-92AB-3E680D3B64AB}"/>
+              </a:ext>
+            </a:extLst>
+          </p:cNvPr>
+          <p:cNvSpPr>
+            <a:spLocks noGrp="1"/>
+          </p:cNvSpPr>
+          <p:nvPr>
+            <p:ph type="title"/>
+          </p:nvPr>
+        </p:nvSpPr>
+        <p:spPr/>
+        <p:txBody>
+          <a:bodyPr/>
+          <a:lstStyle/>
+          <a:p>
+            <a:endParaRPr lang="en-US"/>
+          </a:p>
+        </p:txBody>
+      </p:sp>
+      <p:sp>
+        <p:nvSpPr>
+          <p:cNvPr id="3" name="Content Placeholder 2">
+            <a:extLst>
+              <a:ext uri="{FF2B5EF4-FFF2-40B4-BE49-F238E27FC236}">
+                <a16:creationId xmlns:a16="http://schemas.microsoft.com/office/drawing/2014/main" id="{45DB0F31-67F5-4B40-97BC-EA021544352A}"/>
+              </a:ext>
+            </a:extLst>
+          </p:cNvPr>
+          <p:cNvSpPr>
+            <a:spLocks noGrp="1"/>
+          </p:cNvSpPr>
+          <p:nvPr>
+            <p:ph idx="1"/>
+          </p:nvPr>
+        </p:nvSpPr>
+        <p:spPr/>
+        <p:txBody>
+          <a:bodyPr/>
+          <a:lstStyle/>
+          <a:p>
+            <a:endParaRPr lang="en-US"/>
+          </a:p>
+        </p:txBody>
+      </p:sp>
+    </p:spTree>
+    <p:extLst>
+      <p:ext uri="{BB962C8B-B14F-4D97-AF65-F5344CB8AC3E}">
+        <p14:creationId xmlns:p14="http://schemas.microsoft.com/office/powerpoint/2010/main" val="3030890866"/>
+      </p:ext>
+    </p:extLst>
+  </p:cSld>
+  <p:clrMapOvr>
+    <a:masterClrMapping/>
+  </p:clrMapOvr>
+</p:sld>
+</file>
+
+<file path=ppt/slides/slide8.xml><?xml version="1.0" encoding="utf-8"?>
+<p:sld xmlns:a="http://schemas.openxmlformats.org/drawingml/2006/main" xmlns:r="http://schemas.openxmlformats.org/officeDocument/2006/relationships" xmlns:p="http://schemas.openxmlformats.org/presentationml/2006/main">
+  <p:cSld>
+    <p:spTree>
+      <p:nvGrpSpPr>
+        <p:cNvPr id="1" name=""/>
+        <p:cNvGrpSpPr/>
+        <p:nvPr/>
+      </p:nvGrpSpPr>
+      <p:grpSpPr>
+        <a:xfrm>
+          <a:off x="0" y="0"/>
+          <a:ext cx="0" cy="0"/>
+          <a:chOff x="0" y="0"/>
+          <a:chExt cx="0" cy="0"/>
+        </a:xfrm>
+      </p:grpSpPr>
+      <p:sp>
+        <p:nvSpPr>
+          <p:cNvPr id="2" name="Title 1">
+            <a:extLst>
+              <a:ext uri="{FF2B5EF4-FFF2-40B4-BE49-F238E27FC236}">
                 <a16:creationId xmlns:a16="http://schemas.microsoft.com/office/drawing/2014/main" id="{EFE81300-E749-45F5-B029-E686D500E8F1}"/>
               </a:ext>
             </a:extLst>
@@ -4198,7 +4392,7 @@
 </p:sld>
 </file>
 
-<file path=ppt/slides/slide8.xml><?xml version="1.0" encoding="utf-8"?>
+<file path=ppt/slides/slide9.xml><?xml version="1.0" encoding="utf-8"?>
 <p:sld xmlns:a="http://schemas.openxmlformats.org/drawingml/2006/main" xmlns:r="http://schemas.openxmlformats.org/officeDocument/2006/relationships" xmlns:p="http://schemas.openxmlformats.org/presentationml/2006/main">
   <p:cSld>
     <p:spTree>

</xml_diff>